<commit_message>
Add peer review statements & update files
</commit_message>
<xml_diff>
--- a/02-ux-design-process/Case-study-slide-deck-Portfolio-Project1.pptx
+++ b/02-ux-design-process/Case-study-slide-deck-Portfolio-Project1.pptx
@@ -73,7 +73,7 @@
         <p:txBody>
           <a:bodyPr/>
           <a:p>
-            <a:fld id="{A74E5A98-3F3E-469C-A029-EB3F4EB185B5}" type="slidenum">
+            <a:fld id="{792ED7F1-2C09-408F-B96B-7A641B43ABB1}" type="slidenum">
               <a:t>&lt;#&gt;</a:t>
             </a:fld>
           </a:p>
@@ -241,7 +241,7 @@
         <p:txBody>
           <a:bodyPr/>
           <a:p>
-            <a:fld id="{C372FADB-F27B-4038-B2AC-A0F9D5BC96D6}" type="slidenum">
+            <a:fld id="{E2F18FDF-407F-4FAF-AB77-870B3A369FD6}" type="slidenum">
               <a:t>&lt;#&gt;</a:t>
             </a:fld>
           </a:p>
@@ -495,7 +495,7 @@
         <p:txBody>
           <a:bodyPr/>
           <a:p>
-            <a:fld id="{211B3B5E-3923-4AEB-A57B-B6D73F3CCB9F}" type="slidenum">
+            <a:fld id="{7ED0EC0D-B97C-4857-B9CC-991B1CC954D7}" type="slidenum">
               <a:t>&lt;#&gt;</a:t>
             </a:fld>
           </a:p>
@@ -835,7 +835,7 @@
         <p:txBody>
           <a:bodyPr/>
           <a:p>
-            <a:fld id="{310CA1EA-2D5B-4EC7-8A7E-0943CE9F848D}" type="slidenum">
+            <a:fld id="{BF4B8B30-FEC7-432E-A1F3-12B6711FDC66}" type="slidenum">
               <a:t>&lt;#&gt;</a:t>
             </a:fld>
           </a:p>
@@ -1647,7 +1647,7 @@
         <p:txBody>
           <a:bodyPr/>
           <a:p>
-            <a:fld id="{02514F85-DA8E-45A6-A051-E65B10CFA207}" type="slidenum">
+            <a:fld id="{DEAA7B14-00FC-4E9A-91F2-6FEA3A8F06A3}" type="slidenum">
               <a:t>&lt;#&gt;</a:t>
             </a:fld>
           </a:p>
@@ -2773,7 +2773,7 @@
         <p:txBody>
           <a:bodyPr/>
           <a:p>
-            <a:fld id="{349C5571-D784-48BC-8840-41B9ED5A9C94}" type="slidenum">
+            <a:fld id="{AC71908D-6E4A-47A6-BB49-345D12A10570}" type="slidenum">
               <a:t>&lt;#&gt;</a:t>
             </a:fld>
           </a:p>
@@ -2895,7 +2895,7 @@
         <p:txBody>
           <a:bodyPr/>
           <a:p>
-            <a:fld id="{09F1BC73-80B2-4426-80F1-1488DD446B91}" type="slidenum">
+            <a:fld id="{28CEB85A-2D3A-497D-92AD-5A411EF838FD}" type="slidenum">
               <a:t>&lt;#&gt;</a:t>
             </a:fld>
           </a:p>
@@ -3020,7 +3020,7 @@
         <p:txBody>
           <a:bodyPr/>
           <a:p>
-            <a:fld id="{E16A182C-D82B-42E1-BEF9-5AB7905513DC}" type="slidenum">
+            <a:fld id="{6BAD6608-D82C-47EA-89F3-6B9BBA80DADF}" type="slidenum">
               <a:t>&lt;#&gt;</a:t>
             </a:fld>
           </a:p>
@@ -3188,7 +3188,7 @@
         <p:txBody>
           <a:bodyPr/>
           <a:p>
-            <a:fld id="{57E10716-8279-4E07-8761-D33B5CE57B10}" type="slidenum">
+            <a:fld id="{490FDF32-A457-4CDF-90D8-CFA6A6A53A7E}" type="slidenum">
               <a:t>&lt;#&gt;</a:t>
             </a:fld>
           </a:p>
@@ -3270,7 +3270,7 @@
         <p:txBody>
           <a:bodyPr/>
           <a:p>
-            <a:fld id="{4D9795D0-0663-42AD-871C-7931607EEA6A}" type="slidenum">
+            <a:fld id="{52E032CE-FA5C-4DE1-B718-565ABC772C2F}" type="slidenum">
               <a:t>&lt;#&gt;</a:t>
             </a:fld>
           </a:p>
@@ -3395,7 +3395,7 @@
         <p:txBody>
           <a:bodyPr/>
           <a:p>
-            <a:fld id="{1A69703E-83D0-47BE-B2FA-7DE4F99B587D}" type="slidenum">
+            <a:fld id="{A030CD2B-B324-4DE8-9FB5-5E3C305D1E2A}" type="slidenum">
               <a:t>&lt;#&gt;</a:t>
             </a:fld>
           </a:p>
@@ -3475,7 +3475,7 @@
         <p:txBody>
           <a:bodyPr/>
           <a:p>
-            <a:fld id="{E58D8B7D-FFFD-4E36-9738-A92809107A51}" type="slidenum">
+            <a:fld id="{C95AE1C7-0F04-47E7-81BD-93831C3A06DC}" type="slidenum">
               <a:t>&lt;#&gt;</a:t>
             </a:fld>
           </a:p>
@@ -3686,7 +3686,7 @@
         <p:txBody>
           <a:bodyPr/>
           <a:p>
-            <a:fld id="{85202A5E-3FC6-4AE0-9C0C-DBCB08414680}" type="slidenum">
+            <a:fld id="{29A44257-8276-46C7-93E3-817648996228}" type="slidenum">
               <a:t>&lt;#&gt;</a:t>
             </a:fld>
           </a:p>
@@ -3897,7 +3897,7 @@
         <p:txBody>
           <a:bodyPr/>
           <a:p>
-            <a:fld id="{620ED1CF-8CB5-4F9B-9397-F85CE3D5CAFD}" type="slidenum">
+            <a:fld id="{7F16FE08-1A57-4D4B-AD24-8CCF3AE75943}" type="slidenum">
               <a:t>&lt;#&gt;</a:t>
             </a:fld>
           </a:p>
@@ -4108,7 +4108,7 @@
         <p:txBody>
           <a:bodyPr/>
           <a:p>
-            <a:fld id="{9DA1A536-AF98-42BF-B6DF-42F6CDB187A2}" type="slidenum">
+            <a:fld id="{723D7F52-EEE3-4D40-8F89-E70AE25B0BCF}" type="slidenum">
               <a:t>&lt;#&gt;</a:t>
             </a:fld>
           </a:p>
@@ -4276,7 +4276,7 @@
         <p:txBody>
           <a:bodyPr/>
           <a:p>
-            <a:fld id="{C12F979A-93B7-4060-9D46-C0314FB3DF2A}" type="slidenum">
+            <a:fld id="{11F194CF-EA1E-48A4-90E5-6CA208EA115D}" type="slidenum">
               <a:t>&lt;#&gt;</a:t>
             </a:fld>
           </a:p>
@@ -4530,7 +4530,7 @@
         <p:txBody>
           <a:bodyPr/>
           <a:p>
-            <a:fld id="{AB3BB1F1-478A-437B-8F91-0C191507204A}" type="slidenum">
+            <a:fld id="{458B4757-9152-4E0B-AA20-150501273B37}" type="slidenum">
               <a:t>&lt;#&gt;</a:t>
             </a:fld>
           </a:p>
@@ -4870,7 +4870,7 @@
         <p:txBody>
           <a:bodyPr/>
           <a:p>
-            <a:fld id="{8A4B23A1-DD82-4637-B634-639704F71904}" type="slidenum">
+            <a:fld id="{DCCA32EA-C37A-44DA-90B2-62B3AA342876}" type="slidenum">
               <a:t>&lt;#&gt;</a:t>
             </a:fld>
           </a:p>
@@ -4912,7 +4912,7 @@
         <p:txBody>
           <a:bodyPr/>
           <a:p>
-            <a:fld id="{0850A652-01BF-41EA-A849-46AB2E403810}" type="slidenum">
+            <a:fld id="{02B16174-BF9E-4F66-8629-AA136A344362}" type="slidenum">
               <a:t>&lt;#&gt;</a:t>
             </a:fld>
           </a:p>
@@ -5034,7 +5034,7 @@
         <p:txBody>
           <a:bodyPr/>
           <a:p>
-            <a:fld id="{A8AA9073-17AA-4B45-A825-C9A9FED67DBB}" type="slidenum">
+            <a:fld id="{88E21B3C-05B3-4C7A-ADBA-26987A828ECB}" type="slidenum">
               <a:t>&lt;#&gt;</a:t>
             </a:fld>
           </a:p>
@@ -5159,7 +5159,7 @@
         <p:txBody>
           <a:bodyPr/>
           <a:p>
-            <a:fld id="{13B5AE77-DB13-48D9-A796-2996B97A11E1}" type="slidenum">
+            <a:fld id="{202FB85B-F115-4CA1-971D-947DCCE907AD}" type="slidenum">
               <a:t>&lt;#&gt;</a:t>
             </a:fld>
           </a:p>
@@ -5327,7 +5327,7 @@
         <p:txBody>
           <a:bodyPr/>
           <a:p>
-            <a:fld id="{A4912E5B-38D6-48BB-9F4F-916D741ED02B}" type="slidenum">
+            <a:fld id="{DE03A768-BBB7-4E84-88F8-4DBA81A95FFB}" type="slidenum">
               <a:t>&lt;#&gt;</a:t>
             </a:fld>
           </a:p>
@@ -5495,7 +5495,7 @@
         <p:txBody>
           <a:bodyPr/>
           <a:p>
-            <a:fld id="{C642802F-C99D-407D-A11B-CBAE1EF65AB1}" type="slidenum">
+            <a:fld id="{83914056-16E0-4AE3-BE2D-1A4366208667}" type="slidenum">
               <a:t>&lt;#&gt;</a:t>
             </a:fld>
           </a:p>
@@ -5577,7 +5577,7 @@
         <p:txBody>
           <a:bodyPr/>
           <a:p>
-            <a:fld id="{957D9BDE-1019-4C2F-8826-ABCAE88390B3}" type="slidenum">
+            <a:fld id="{12D7A88D-6E78-4C06-B434-82219D42647F}" type="slidenum">
               <a:t>&lt;#&gt;</a:t>
             </a:fld>
           </a:p>
@@ -5657,7 +5657,7 @@
         <p:txBody>
           <a:bodyPr/>
           <a:p>
-            <a:fld id="{CFBD0E09-3DFA-4C21-873E-85BE97DBC630}" type="slidenum">
+            <a:fld id="{290341EA-E968-40B2-BB20-E85CAEE210E9}" type="slidenum">
               <a:t>&lt;#&gt;</a:t>
             </a:fld>
           </a:p>
@@ -5868,7 +5868,7 @@
         <p:txBody>
           <a:bodyPr/>
           <a:p>
-            <a:fld id="{5E40ADC8-4A94-4BE8-937C-98D08517E53A}" type="slidenum">
+            <a:fld id="{6211F0AB-AF1C-49AE-BF56-446CE9A54913}" type="slidenum">
               <a:t>&lt;#&gt;</a:t>
             </a:fld>
           </a:p>
@@ -6079,7 +6079,7 @@
         <p:txBody>
           <a:bodyPr/>
           <a:p>
-            <a:fld id="{2D593B77-99AD-4F73-8EC7-85506D6BC277}" type="slidenum">
+            <a:fld id="{8CFA55B8-209F-46F0-A7FC-7609597ED777}" type="slidenum">
               <a:t>&lt;#&gt;</a:t>
             </a:fld>
           </a:p>
@@ -6290,7 +6290,7 @@
         <p:txBody>
           <a:bodyPr/>
           <a:p>
-            <a:fld id="{F57F510F-FBD5-441C-A778-F6A86E40EF48}" type="slidenum">
+            <a:fld id="{71C37718-7B30-4998-807B-AC066A8CF696}" type="slidenum">
               <a:t>&lt;#&gt;</a:t>
             </a:fld>
           </a:p>
@@ -6458,7 +6458,7 @@
         <p:txBody>
           <a:bodyPr/>
           <a:p>
-            <a:fld id="{1AD98856-C8EF-444C-966F-10ABD0136461}" type="slidenum">
+            <a:fld id="{4EDE3590-810F-43F3-8988-0A5F75CDFDE4}" type="slidenum">
               <a:t>&lt;#&gt;</a:t>
             </a:fld>
           </a:p>
@@ -6712,7 +6712,7 @@
         <p:txBody>
           <a:bodyPr/>
           <a:p>
-            <a:fld id="{F0F3785F-EF4D-4AF1-BBEF-D9D3A0C6E9D7}" type="slidenum">
+            <a:fld id="{A177B33F-4B24-4A41-9DC9-C441BA466146}" type="slidenum">
               <a:t>&lt;#&gt;</a:t>
             </a:fld>
           </a:p>
@@ -7052,7 +7052,7 @@
         <p:txBody>
           <a:bodyPr/>
           <a:p>
-            <a:fld id="{298A25D0-D970-4639-B14A-121797B98FAC}" type="slidenum">
+            <a:fld id="{B5729397-0FDA-4084-9ACF-62EE35E42F3A}" type="slidenum">
               <a:t>&lt;#&gt;</a:t>
             </a:fld>
           </a:p>
@@ -7094,7 +7094,7 @@
         <p:txBody>
           <a:bodyPr/>
           <a:p>
-            <a:fld id="{5DB91C89-92FF-48D7-8527-60F30A34D505}" type="slidenum">
+            <a:fld id="{DD979E1D-1924-4EA3-88C3-77C688AB2454}" type="slidenum">
               <a:t>&lt;#&gt;</a:t>
             </a:fld>
           </a:p>
@@ -7176,7 +7176,7 @@
         <p:txBody>
           <a:bodyPr/>
           <a:p>
-            <a:fld id="{B548D482-2436-4EFF-8DBE-FEEAC29939A9}" type="slidenum">
+            <a:fld id="{65FA2D86-287C-482C-A30A-EEF2BC5E5F51}" type="slidenum">
               <a:t>&lt;#&gt;</a:t>
             </a:fld>
           </a:p>
@@ -7298,7 +7298,7 @@
         <p:txBody>
           <a:bodyPr/>
           <a:p>
-            <a:fld id="{337D485A-661A-40EC-82BA-5F634CEFB5C2}" type="slidenum">
+            <a:fld id="{910F534D-4244-4609-B12B-17DE29A262FE}" type="slidenum">
               <a:t>&lt;#&gt;</a:t>
             </a:fld>
           </a:p>
@@ -7423,7 +7423,7 @@
         <p:txBody>
           <a:bodyPr/>
           <a:p>
-            <a:fld id="{0D37EC5E-944C-421F-AB86-7466CE2FD0F9}" type="slidenum">
+            <a:fld id="{8F9F7BC9-59B9-4B73-8720-A7CC3CF261AE}" type="slidenum">
               <a:t>&lt;#&gt;</a:t>
             </a:fld>
           </a:p>
@@ -7591,7 +7591,7 @@
         <p:txBody>
           <a:bodyPr/>
           <a:p>
-            <a:fld id="{FF88EEE8-9958-427D-81CB-41C98B36D232}" type="slidenum">
+            <a:fld id="{65FA3FDA-5EC0-4DFB-AF5C-531106F0F4B1}" type="slidenum">
               <a:t>&lt;#&gt;</a:t>
             </a:fld>
           </a:p>
@@ -7673,7 +7673,7 @@
         <p:txBody>
           <a:bodyPr/>
           <a:p>
-            <a:fld id="{EFFCBC96-5208-49A2-89F0-BE31773E6FF4}" type="slidenum">
+            <a:fld id="{7FEED0F6-CE26-447B-B71E-763405D7DD53}" type="slidenum">
               <a:t>&lt;#&gt;</a:t>
             </a:fld>
           </a:p>
@@ -7753,7 +7753,7 @@
         <p:txBody>
           <a:bodyPr/>
           <a:p>
-            <a:fld id="{7349C3B0-4BD1-43EC-901F-A9B5DD558589}" type="slidenum">
+            <a:fld id="{A14F276A-03ED-425E-A84B-594EBE8A476F}" type="slidenum">
               <a:t>&lt;#&gt;</a:t>
             </a:fld>
           </a:p>
@@ -7964,7 +7964,7 @@
         <p:txBody>
           <a:bodyPr/>
           <a:p>
-            <a:fld id="{408D6879-8B79-4A71-90E5-5B6E9C0F3A14}" type="slidenum">
+            <a:fld id="{EBF82B3A-615B-423E-9990-F05360FE7A18}" type="slidenum">
               <a:t>&lt;#&gt;</a:t>
             </a:fld>
           </a:p>
@@ -8175,7 +8175,7 @@
         <p:txBody>
           <a:bodyPr/>
           <a:p>
-            <a:fld id="{EF1F7194-3583-46B7-873E-4B66D9E926CA}" type="slidenum">
+            <a:fld id="{70903DEE-1D73-4F20-A9AD-ED0B99826C76}" type="slidenum">
               <a:t>&lt;#&gt;</a:t>
             </a:fld>
           </a:p>
@@ -8386,7 +8386,7 @@
         <p:txBody>
           <a:bodyPr/>
           <a:p>
-            <a:fld id="{87E4E70D-2104-4241-AFDC-5040B61588E2}" type="slidenum">
+            <a:fld id="{5E429D89-971B-46DC-9D1A-2CF0A92D9E8E}" type="slidenum">
               <a:t>&lt;#&gt;</a:t>
             </a:fld>
           </a:p>
@@ -8554,7 +8554,7 @@
         <p:txBody>
           <a:bodyPr/>
           <a:p>
-            <a:fld id="{E14D07F5-57FA-4D4E-8A74-1F491BE4E65E}" type="slidenum">
+            <a:fld id="{3C87C949-A969-4EA3-98E0-B19390A656B1}" type="slidenum">
               <a:t>&lt;#&gt;</a:t>
             </a:fld>
           </a:p>
@@ -8808,7 +8808,7 @@
         <p:txBody>
           <a:bodyPr/>
           <a:p>
-            <a:fld id="{67089F7B-8EA7-4B3B-8078-740D8230E824}" type="slidenum">
+            <a:fld id="{FD475A92-631C-44CF-B5B2-A0C5745AD04D}" type="slidenum">
               <a:t>&lt;#&gt;</a:t>
             </a:fld>
           </a:p>
@@ -8888,7 +8888,7 @@
         <p:txBody>
           <a:bodyPr/>
           <a:p>
-            <a:fld id="{231A9D20-875C-454E-A6FC-EDF11C9B5DD2}" type="slidenum">
+            <a:fld id="{00524845-E1F5-4474-9FA8-FFC13DE9358E}" type="slidenum">
               <a:t>&lt;#&gt;</a:t>
             </a:fld>
           </a:p>
@@ -9228,7 +9228,7 @@
         <p:txBody>
           <a:bodyPr/>
           <a:p>
-            <a:fld id="{0E486FF6-2F7F-41A8-B686-A2047344B229}" type="slidenum">
+            <a:fld id="{75A18CEC-772A-46FE-8441-3E97766C87A2}" type="slidenum">
               <a:t>&lt;#&gt;</a:t>
             </a:fld>
           </a:p>
@@ -9270,7 +9270,7 @@
         <p:txBody>
           <a:bodyPr/>
           <a:p>
-            <a:fld id="{7BABAA92-2854-436D-9142-2BFA4C244843}" type="slidenum">
+            <a:fld id="{E3CD94DE-49DA-47DC-B8EE-FD67B43F6C1C}" type="slidenum">
               <a:t>&lt;#&gt;</a:t>
             </a:fld>
           </a:p>
@@ -9392,7 +9392,7 @@
         <p:txBody>
           <a:bodyPr/>
           <a:p>
-            <a:fld id="{D1D98291-CB17-4C86-8C04-9DEEEABF1461}" type="slidenum">
+            <a:fld id="{A5712659-C490-478F-A589-B6C956DA65C2}" type="slidenum">
               <a:t>&lt;#&gt;</a:t>
             </a:fld>
           </a:p>
@@ -9517,7 +9517,7 @@
         <p:txBody>
           <a:bodyPr/>
           <a:p>
-            <a:fld id="{63407B8B-D22D-4847-9DDE-FDE998876C8E}" type="slidenum">
+            <a:fld id="{C6A526E0-917D-4749-9B1E-9815F31BAC97}" type="slidenum">
               <a:t>&lt;#&gt;</a:t>
             </a:fld>
           </a:p>
@@ -9685,7 +9685,7 @@
         <p:txBody>
           <a:bodyPr/>
           <a:p>
-            <a:fld id="{D98CAFF7-05AC-468C-A737-E558C0D6E6C8}" type="slidenum">
+            <a:fld id="{FC4F2034-820F-4FBE-92AF-466EAF4E1C86}" type="slidenum">
               <a:t>&lt;#&gt;</a:t>
             </a:fld>
           </a:p>
@@ -9767,7 +9767,7 @@
         <p:txBody>
           <a:bodyPr/>
           <a:p>
-            <a:fld id="{043D9844-70AE-4525-97AC-160BDEDB05C5}" type="slidenum">
+            <a:fld id="{AA4C4331-9C2C-4AF4-9FF4-3DC6A9249D0C}" type="slidenum">
               <a:t>&lt;#&gt;</a:t>
             </a:fld>
           </a:p>
@@ -9847,7 +9847,7 @@
         <p:txBody>
           <a:bodyPr/>
           <a:p>
-            <a:fld id="{15609DF4-F23D-47E1-903F-8D1FAE83765A}" type="slidenum">
+            <a:fld id="{C4508767-7598-4C00-9AAF-D58134653645}" type="slidenum">
               <a:t>&lt;#&gt;</a:t>
             </a:fld>
           </a:p>
@@ -10058,7 +10058,7 @@
         <p:txBody>
           <a:bodyPr/>
           <a:p>
-            <a:fld id="{BB3B7F38-65E1-4ADC-804E-1F000ADEC607}" type="slidenum">
+            <a:fld id="{E7952B02-D8E5-4134-B89A-689940518091}" type="slidenum">
               <a:t>&lt;#&gt;</a:t>
             </a:fld>
           </a:p>
@@ -10269,7 +10269,7 @@
         <p:txBody>
           <a:bodyPr/>
           <a:p>
-            <a:fld id="{F9A91E30-FEE7-427F-B74C-34B2EAC17BE0}" type="slidenum">
+            <a:fld id="{86CE6429-A533-45DD-90EF-0B112D4402A0}" type="slidenum">
               <a:t>&lt;#&gt;</a:t>
             </a:fld>
           </a:p>
@@ -10480,7 +10480,7 @@
         <p:txBody>
           <a:bodyPr/>
           <a:p>
-            <a:fld id="{28735A91-C653-4154-9F4C-D59ACF1D9200}" type="slidenum">
+            <a:fld id="{E2F7D87D-28B4-4A2A-B59B-2457F75C2F47}" type="slidenum">
               <a:t>&lt;#&gt;</a:t>
             </a:fld>
           </a:p>
@@ -10691,7 +10691,7 @@
         <p:txBody>
           <a:bodyPr/>
           <a:p>
-            <a:fld id="{B5A9272B-D4C3-4880-9587-E2DA2EAFECFB}" type="slidenum">
+            <a:fld id="{81D704DF-4037-4C49-B8D7-3211363D7A7B}" type="slidenum">
               <a:t>&lt;#&gt;</a:t>
             </a:fld>
           </a:p>
@@ -10859,7 +10859,7 @@
         <p:txBody>
           <a:bodyPr/>
           <a:p>
-            <a:fld id="{B978B4F5-C64D-45D9-825B-A06545B92BC9}" type="slidenum">
+            <a:fld id="{C91F1E1E-D51D-4B3B-8020-753536D6259B}" type="slidenum">
               <a:t>&lt;#&gt;</a:t>
             </a:fld>
           </a:p>
@@ -11113,7 +11113,7 @@
         <p:txBody>
           <a:bodyPr/>
           <a:p>
-            <a:fld id="{FE28243E-FE96-4643-A4BA-D7286BEBF753}" type="slidenum">
+            <a:fld id="{CA2ADB7A-8141-4D78-A306-D0191392A54C}" type="slidenum">
               <a:t>&lt;#&gt;</a:t>
             </a:fld>
           </a:p>
@@ -11453,7 +11453,7 @@
         <p:txBody>
           <a:bodyPr/>
           <a:p>
-            <a:fld id="{BE42F266-3B7E-47F1-8AF5-D91694F27EA9}" type="slidenum">
+            <a:fld id="{5D079923-70DC-40CC-A6FE-6EBFF67A0900}" type="slidenum">
               <a:t>&lt;#&gt;</a:t>
             </a:fld>
           </a:p>
@@ -11495,7 +11495,7 @@
         <p:txBody>
           <a:bodyPr/>
           <a:p>
-            <a:fld id="{ABFAE233-00E3-4578-A400-E7139F06B06C}" type="slidenum">
+            <a:fld id="{38EED17D-40DF-44BA-84F8-422A9FFDA083}" type="slidenum">
               <a:t>&lt;#&gt;</a:t>
             </a:fld>
           </a:p>
@@ -11617,7 +11617,7 @@
         <p:txBody>
           <a:bodyPr/>
           <a:p>
-            <a:fld id="{D729F5DA-A8EF-403F-9E53-1D04226301A7}" type="slidenum">
+            <a:fld id="{09254117-235A-4344-A48D-2B2DE05BAC12}" type="slidenum">
               <a:t>&lt;#&gt;</a:t>
             </a:fld>
           </a:p>
@@ -11742,7 +11742,7 @@
         <p:txBody>
           <a:bodyPr/>
           <a:p>
-            <a:fld id="{FA9B9492-F895-4222-A12A-0477D3480D32}" type="slidenum">
+            <a:fld id="{D033CD97-D487-45E5-BBDA-7823964BB585}" type="slidenum">
               <a:t>&lt;#&gt;</a:t>
             </a:fld>
           </a:p>
@@ -11910,7 +11910,7 @@
         <p:txBody>
           <a:bodyPr/>
           <a:p>
-            <a:fld id="{A4A262B8-020B-4F4D-A53D-FFDD6D9C3F54}" type="slidenum">
+            <a:fld id="{63357EF5-CBB7-4AAA-874C-222D880E1646}" type="slidenum">
               <a:t>&lt;#&gt;</a:t>
             </a:fld>
           </a:p>
@@ -11992,7 +11992,7 @@
         <p:txBody>
           <a:bodyPr/>
           <a:p>
-            <a:fld id="{1E102002-6333-48D0-A7B8-DB99285043A9}" type="slidenum">
+            <a:fld id="{5D7BD3D9-A45A-460D-9AF7-6EB30BF7326C}" type="slidenum">
               <a:t>&lt;#&gt;</a:t>
             </a:fld>
           </a:p>
@@ -12072,7 +12072,7 @@
         <p:txBody>
           <a:bodyPr/>
           <a:p>
-            <a:fld id="{501298E7-6ED6-4E6D-88D4-A16F0E79DBD1}" type="slidenum">
+            <a:fld id="{E8E14FD5-144A-4120-9F4F-1DFAF79C21C3}" type="slidenum">
               <a:t>&lt;#&gt;</a:t>
             </a:fld>
           </a:p>
@@ -12283,7 +12283,7 @@
         <p:txBody>
           <a:bodyPr/>
           <a:p>
-            <a:fld id="{30908733-6B9A-4F3B-BA9B-30D883E90941}" type="slidenum">
+            <a:fld id="{6F64AD3E-2CD7-4E76-BD12-6764D8B11F35}" type="slidenum">
               <a:t>&lt;#&gt;</a:t>
             </a:fld>
           </a:p>
@@ -12494,7 +12494,7 @@
         <p:txBody>
           <a:bodyPr/>
           <a:p>
-            <a:fld id="{1693E29E-5D1E-4133-ABC9-880FA28E6182}" type="slidenum">
+            <a:fld id="{89D33E10-EFE0-415F-8603-FE893CE12750}" type="slidenum">
               <a:t>&lt;#&gt;</a:t>
             </a:fld>
           </a:p>
@@ -12705,7 +12705,7 @@
         <p:txBody>
           <a:bodyPr/>
           <a:p>
-            <a:fld id="{C2CB3ADB-27DD-442A-9437-15290208B6CD}" type="slidenum">
+            <a:fld id="{4F5E3B53-35F6-4A68-8729-0B2A32AD62AE}" type="slidenum">
               <a:t>&lt;#&gt;</a:t>
             </a:fld>
           </a:p>
@@ -12916,7 +12916,7 @@
         <p:txBody>
           <a:bodyPr/>
           <a:p>
-            <a:fld id="{E838D88B-8FA1-4377-98CE-51E923D85AAF}" type="slidenum">
+            <a:fld id="{A1298477-3974-4669-BE02-320230140A59}" type="slidenum">
               <a:t>&lt;#&gt;</a:t>
             </a:fld>
           </a:p>
@@ -13084,7 +13084,7 @@
         <p:txBody>
           <a:bodyPr/>
           <a:p>
-            <a:fld id="{207FF799-55DC-40EF-8134-565C6A146EB7}" type="slidenum">
+            <a:fld id="{64213470-0916-4F09-84B7-8E79E8BA5D3E}" type="slidenum">
               <a:t>&lt;#&gt;</a:t>
             </a:fld>
           </a:p>
@@ -13338,7 +13338,7 @@
         <p:txBody>
           <a:bodyPr/>
           <a:p>
-            <a:fld id="{D68B6031-CDC8-47C1-8D87-89C66251596D}" type="slidenum">
+            <a:fld id="{14E765D3-AB14-44E8-9132-6908B891D3C9}" type="slidenum">
               <a:t>&lt;#&gt;</a:t>
             </a:fld>
           </a:p>
@@ -13678,7 +13678,7 @@
         <p:txBody>
           <a:bodyPr/>
           <a:p>
-            <a:fld id="{A5B2B6F6-05A9-4063-A6C6-68A74F8731A9}" type="slidenum">
+            <a:fld id="{C3425814-2521-49BD-96AC-EEF5FA4977ED}" type="slidenum">
               <a:t>&lt;#&gt;</a:t>
             </a:fld>
           </a:p>
@@ -13889,7 +13889,7 @@
         <p:txBody>
           <a:bodyPr/>
           <a:p>
-            <a:fld id="{88758595-B35B-46F3-B2E3-86CDA8294670}" type="slidenum">
+            <a:fld id="{8383EFEF-7561-4C82-8BA1-F0798957C374}" type="slidenum">
               <a:t>&lt;#&gt;</a:t>
             </a:fld>
           </a:p>
@@ -13962,16 +13962,7 @@
                 </a:solidFill>
                 <a:latin typeface="Arial"/>
               </a:rPr>
-              <a:t>Click to edit the title </a:t>
-            </a:r>
-            <a:r>
-              <a:rPr b="0" lang="en-US" sz="5200" spc="-1" strike="noStrike">
-                <a:solidFill>
-                  <a:srgbClr val="000000"/>
-                </a:solidFill>
-                <a:latin typeface="Arial"/>
-              </a:rPr>
-              <a:t>text format</a:t>
+              <a:t>Click to edit the title text format</a:t>
             </a:r>
             <a:endParaRPr b="0" lang="en-US" sz="5200" spc="-1" strike="noStrike">
               <a:solidFill>
@@ -14037,7 +14028,7 @@
                 <a:tab algn="l" pos="0"/>
               </a:tabLst>
             </a:pPr>
-            <a:fld id="{2F67D7A3-8A24-4E94-A03F-AC59B56BE9DE}" type="slidenum">
+            <a:fld id="{B1FF0670-C6EB-4B1A-949F-ED0081932BB0}" type="slidenum">
               <a:rPr b="0" lang="en" sz="1000" spc="-1" strike="noStrike">
                 <a:solidFill>
                   <a:schemeClr val="dk2"/>
@@ -14816,7 +14807,7 @@
                 <a:tab algn="l" pos="0"/>
               </a:tabLst>
             </a:pPr>
-            <a:fld id="{06534216-2CD0-4E47-8994-589F185D9C9A}" type="slidenum">
+            <a:fld id="{38EA7269-865C-40A9-A4B3-64C07B79E34E}" type="slidenum">
               <a:rPr b="0" lang="en" sz="1000" spc="-1" strike="noStrike">
                 <a:solidFill>
                   <a:schemeClr val="dk2"/>
@@ -15280,7 +15271,7 @@
                 <a:tab algn="l" pos="0"/>
               </a:tabLst>
             </a:pPr>
-            <a:fld id="{61458350-66CF-456D-B055-AF2843CD1FB4}" type="slidenum">
+            <a:fld id="{9B9C6417-DA90-4DAE-A67E-0CDBA71EFD89}" type="slidenum">
               <a:rPr b="0" lang="en" sz="1000" spc="-1" strike="noStrike">
                 <a:solidFill>
                   <a:schemeClr val="dk2"/>
@@ -15744,7 +15735,7 @@
                 <a:tab algn="l" pos="0"/>
               </a:tabLst>
             </a:pPr>
-            <a:fld id="{9659DCAF-3F66-4FD1-9D7A-6293DCE50DCE}" type="slidenum">
+            <a:fld id="{B4E4D15F-E4FD-4E6F-ACBE-67B716CCC8B0}" type="slidenum">
               <a:rPr b="0" lang="en" sz="1000" spc="-1" strike="noStrike">
                 <a:solidFill>
                   <a:schemeClr val="dk2"/>
@@ -16208,7 +16199,7 @@
                 <a:tab algn="l" pos="0"/>
               </a:tabLst>
             </a:pPr>
-            <a:fld id="{11FDCA47-71C5-4FF7-BBD2-7D3F5D07C2FD}" type="slidenum">
+            <a:fld id="{BC7E1BD6-4DA2-4E52-8604-6B0DD00FD79E}" type="slidenum">
               <a:rPr b="0" lang="en" sz="1000" spc="-1" strike="noStrike">
                 <a:solidFill>
                   <a:schemeClr val="dk2"/>
@@ -16672,7 +16663,7 @@
                 <a:tab algn="l" pos="0"/>
               </a:tabLst>
             </a:pPr>
-            <a:fld id="{D09517EF-D038-4E03-8F22-0F25DAB83EF1}" type="slidenum">
+            <a:fld id="{A9E0DF99-086F-4334-B5A3-A8568CEF9C0F}" type="slidenum">
               <a:rPr b="0" lang="en" sz="1000" spc="-1" strike="noStrike">
                 <a:solidFill>
                   <a:schemeClr val="dk2"/>

</xml_diff>